<commit_message>
minor presentation update following meeting
</commit_message>
<xml_diff>
--- a/ggplot/ggplot.pptx
+++ b/ggplot/ggplot.pptx
@@ -3428,11 +3428,7 @@
             </a:r>
             <a:r>
               <a:rPr lang="en-US" dirty="0" smtClean="0"/>
-              <a:t>)) </a:t>
-            </a:r>
-            <a:r>
-              <a:rPr lang="en-US" dirty="0" smtClean="0"/>
-              <a:t>+</a:t>
+              <a:t>)) +</a:t>
             </a:r>
           </a:p>
           <a:p>
@@ -5485,8 +5481,13 @@
           <a:p>
             <a:r>
               <a:rPr lang="en-US" dirty="0" smtClean="0"/>
-              <a:t>Aesthetics include fill, (line) color, shape, size that are determined by ID variables</a:t>
-            </a:r>
+              <a:t>Aesthetics include fill, (line) color, shape, size that are determined by </a:t>
+            </a:r>
+            <a:r>
+              <a:rPr lang="en-US" dirty="0" smtClean="0"/>
+              <a:t>variables</a:t>
+            </a:r>
+            <a:endParaRPr lang="en-US" dirty="0" smtClean="0"/>
           </a:p>
           <a:p>
             <a:pPr lvl="1"/>

</xml_diff>